<commit_message>
Updated ppt and added screenshot
</commit_message>
<xml_diff>
--- a/CustomerRetentionPrediction.pptx
+++ b/CustomerRetentionPrediction.pptx
@@ -6346,7 +6346,7 @@
           <a:p>
             <a:fld id="{645AB473-C3E0-CE40-81FE-89B529EA2E6A}" type="datetimeFigureOut">
               <a:rPr lang="en-US" smtClean="0"/>
-              <a:t>11/10/21</a:t>
+              <a:t>1/3/22</a:t>
             </a:fld>
             <a:endParaRPr lang="en-US"/>
           </a:p>
@@ -6524,7 +6524,7 @@
           <a:p>
             <a:fld id="{F23DAB1B-C488-2445-801C-931080617E9A}" type="datetimeFigureOut">
               <a:rPr lang="en-US" smtClean="0"/>
-              <a:t>11/9/21</a:t>
+              <a:t>1/3/22</a:t>
             </a:fld>
             <a:endParaRPr lang="en-US"/>
           </a:p>
@@ -9287,7 +9287,7 @@
           <a:p>
             <a:fld id="{CD2FEBDE-7ADE-AA42-B8A5-FEA0E619B9B0}" type="datetime1">
               <a:rPr lang="en-US" smtClean="0"/>
-              <a:t>11/10/21</a:t>
+              <a:t>1/3/22</a:t>
             </a:fld>
             <a:endParaRPr lang="en-US"/>
           </a:p>
@@ -9485,7 +9485,7 @@
           <a:p>
             <a:fld id="{123B8D45-964F-3F43-8891-607831A75E17}" type="datetime1">
               <a:rPr lang="en-US" smtClean="0"/>
-              <a:t>11/10/21</a:t>
+              <a:t>1/3/22</a:t>
             </a:fld>
             <a:endParaRPr lang="en-US"/>
           </a:p>
@@ -9693,7 +9693,7 @@
           <a:p>
             <a:fld id="{86EF0FB0-2B1F-9C4F-8A20-CF403AB1E21E}" type="datetime1">
               <a:rPr lang="en-US" smtClean="0"/>
-              <a:t>11/10/21</a:t>
+              <a:t>1/3/22</a:t>
             </a:fld>
             <a:endParaRPr lang="en-US"/>
           </a:p>
@@ -9891,7 +9891,7 @@
           <a:p>
             <a:fld id="{B60650BE-56E9-9F4E-960F-3DAD5999066B}" type="datetime1">
               <a:rPr lang="en-US" smtClean="0"/>
-              <a:t>11/10/21</a:t>
+              <a:t>1/3/22</a:t>
             </a:fld>
             <a:endParaRPr lang="en-US"/>
           </a:p>
@@ -10166,7 +10166,7 @@
           <a:p>
             <a:fld id="{82680095-5F63-8443-ADEE-223602C7332B}" type="datetime1">
               <a:rPr lang="en-US" smtClean="0"/>
-              <a:t>11/10/21</a:t>
+              <a:t>1/3/22</a:t>
             </a:fld>
             <a:endParaRPr lang="en-US"/>
           </a:p>
@@ -10431,7 +10431,7 @@
           <a:p>
             <a:fld id="{ECA11DD8-4380-434E-B581-734E5CE10A9D}" type="datetime1">
               <a:rPr lang="en-US" smtClean="0"/>
-              <a:t>11/10/21</a:t>
+              <a:t>1/3/22</a:t>
             </a:fld>
             <a:endParaRPr lang="en-US"/>
           </a:p>
@@ -10843,7 +10843,7 @@
           <a:p>
             <a:fld id="{C0063AC9-05AE-E042-A589-C69822951FDD}" type="datetime1">
               <a:rPr lang="en-US" smtClean="0"/>
-              <a:t>11/10/21</a:t>
+              <a:t>1/3/22</a:t>
             </a:fld>
             <a:endParaRPr lang="en-US"/>
           </a:p>
@@ -10984,7 +10984,7 @@
           <a:p>
             <a:fld id="{9730C4E2-56FC-0B41-AB4C-A5DA34CC10EA}" type="datetime1">
               <a:rPr lang="en-US" smtClean="0"/>
-              <a:t>11/10/21</a:t>
+              <a:t>1/3/22</a:t>
             </a:fld>
             <a:endParaRPr lang="en-US"/>
           </a:p>
@@ -11097,7 +11097,7 @@
           <a:p>
             <a:fld id="{DB106891-E420-EC42-833D-86F15C4B51EE}" type="datetime1">
               <a:rPr lang="en-US" smtClean="0"/>
-              <a:t>11/10/21</a:t>
+              <a:t>1/3/22</a:t>
             </a:fld>
             <a:endParaRPr lang="en-US"/>
           </a:p>
@@ -11408,7 +11408,7 @@
           <a:p>
             <a:fld id="{F377B90A-6841-C441-8093-0BB8DBF8BC0B}" type="datetime1">
               <a:rPr lang="en-US" smtClean="0"/>
-              <a:t>11/10/21</a:t>
+              <a:t>1/3/22</a:t>
             </a:fld>
             <a:endParaRPr lang="en-US"/>
           </a:p>
@@ -11696,7 +11696,7 @@
           <a:p>
             <a:fld id="{2A26E6A0-40B0-2347-8FA5-421AB7C463A8}" type="datetime1">
               <a:rPr lang="en-US" smtClean="0"/>
-              <a:t>11/10/21</a:t>
+              <a:t>1/3/22</a:t>
             </a:fld>
             <a:endParaRPr lang="en-US"/>
           </a:p>
@@ -11937,7 +11937,7 @@
           <a:p>
             <a:fld id="{C81CD807-DE2F-2247-8B24-627F93F60FC5}" type="datetime1">
               <a:rPr lang="en-US" smtClean="0"/>
-              <a:t>11/10/21</a:t>
+              <a:t>1/3/22</a:t>
             </a:fld>
             <a:endParaRPr lang="en-US"/>
           </a:p>
@@ -12642,11 +12642,11 @@
   <p:clrMapOvr>
     <a:masterClrMapping/>
   </p:clrMapOvr>
-  <mc:AlternateContent xmlns:mc="http://schemas.openxmlformats.org/markup-compatibility/2006">
-    <mc:Choice xmlns:p14="http://schemas.microsoft.com/office/powerpoint/2010/main" Requires="p14">
+  <mc:AlternateContent xmlns:mc="http://schemas.openxmlformats.org/markup-compatibility/2006" xmlns:p14="http://schemas.microsoft.com/office/powerpoint/2010/main">
+    <mc:Choice Requires="p14">
       <p:transition spd="slow" p14:dur="2000" advTm="6780"/>
     </mc:Choice>
-    <mc:Fallback>
+    <mc:Fallback xmlns="">
       <p:transition spd="slow" advTm="6780"/>
     </mc:Fallback>
   </mc:AlternateContent>
@@ -12862,11 +12862,11 @@
   <p:clrMapOvr>
     <a:masterClrMapping/>
   </p:clrMapOvr>
-  <mc:AlternateContent xmlns:mc="http://schemas.openxmlformats.org/markup-compatibility/2006">
-    <mc:Choice xmlns:p14="http://schemas.microsoft.com/office/powerpoint/2010/main" Requires="p14">
+  <mc:AlternateContent xmlns:mc="http://schemas.openxmlformats.org/markup-compatibility/2006" xmlns:p14="http://schemas.microsoft.com/office/powerpoint/2010/main">
+    <mc:Choice Requires="p14">
       <p:transition spd="slow" p14:dur="2000" advTm="130"/>
     </mc:Choice>
-    <mc:Fallback>
+    <mc:Fallback xmlns="">
       <p:transition spd="slow" advTm="130"/>
     </mc:Fallback>
   </mc:AlternateContent>
@@ -13111,11 +13111,11 @@
   <p:clrMapOvr>
     <a:masterClrMapping/>
   </p:clrMapOvr>
-  <mc:AlternateContent xmlns:mc="http://schemas.openxmlformats.org/markup-compatibility/2006">
-    <mc:Choice xmlns:p14="http://schemas.microsoft.com/office/powerpoint/2010/main" Requires="p14">
+  <mc:AlternateContent xmlns:mc="http://schemas.openxmlformats.org/markup-compatibility/2006" xmlns:p14="http://schemas.microsoft.com/office/powerpoint/2010/main">
+    <mc:Choice Requires="p14">
       <p:transition spd="slow" p14:dur="2000" advTm="149"/>
     </mc:Choice>
-    <mc:Fallback>
+    <mc:Fallback xmlns="">
       <p:transition spd="slow" advTm="149"/>
     </mc:Fallback>
   </mc:AlternateContent>
@@ -13338,11 +13338,11 @@
   <p:clrMapOvr>
     <a:masterClrMapping/>
   </p:clrMapOvr>
-  <mc:AlternateContent xmlns:mc="http://schemas.openxmlformats.org/markup-compatibility/2006">
-    <mc:Choice xmlns:p14="http://schemas.microsoft.com/office/powerpoint/2010/main" Requires="p14">
+  <mc:AlternateContent xmlns:mc="http://schemas.openxmlformats.org/markup-compatibility/2006" xmlns:p14="http://schemas.microsoft.com/office/powerpoint/2010/main">
+    <mc:Choice Requires="p14">
       <p:transition spd="slow" p14:dur="2000" advTm="335"/>
     </mc:Choice>
-    <mc:Fallback>
+    <mc:Fallback xmlns="">
       <p:transition spd="slow" advTm="335"/>
     </mc:Fallback>
   </mc:AlternateContent>
@@ -16880,11 +16880,11 @@
   <p:clrMapOvr>
     <a:masterClrMapping/>
   </p:clrMapOvr>
-  <mc:AlternateContent xmlns:mc="http://schemas.openxmlformats.org/markup-compatibility/2006">
-    <mc:Choice xmlns:p14="http://schemas.microsoft.com/office/powerpoint/2010/main" Requires="p14">
+  <mc:AlternateContent xmlns:mc="http://schemas.openxmlformats.org/markup-compatibility/2006" xmlns:p14="http://schemas.microsoft.com/office/powerpoint/2010/main">
+    <mc:Choice Requires="p14">
       <p:transition spd="slow" p14:dur="2000" advTm="145"/>
     </mc:Choice>
-    <mc:Fallback>
+    <mc:Fallback xmlns="">
       <p:transition spd="slow" advTm="145"/>
     </mc:Fallback>
   </mc:AlternateContent>
@@ -18423,7 +18423,7 @@
         </p:spPr>
         <p:txBody>
           <a:bodyPr anchor="t">
-            <a:normAutofit fontScale="85000" lnSpcReduction="20000"/>
+            <a:normAutofit fontScale="77500" lnSpcReduction="20000"/>
           </a:bodyPr>
           <a:lstStyle/>
           <a:p>
@@ -18463,6 +18463,13 @@
             <a:pPr lvl="1"/>
             <a:r>
               <a:rPr lang="en-US" dirty="0"/>
+              <a:t># of products visited</a:t>
+            </a:r>
+          </a:p>
+          <a:p>
+            <a:pPr lvl="1"/>
+            <a:r>
+              <a:rPr lang="en-US" dirty="0"/>
               <a:t>Tenure per user</a:t>
             </a:r>
           </a:p>
@@ -18470,7 +18477,7 @@
             <a:pPr lvl="1"/>
             <a:r>
               <a:rPr lang="en-US" dirty="0"/>
-              <a:t>Items in cart flag per user</a:t>
+              <a:t>Pending cart flag per user</a:t>
             </a:r>
           </a:p>
           <a:p>
@@ -18491,7 +18498,7 @@
           <a:p>
             <a:r>
               <a:rPr lang="en-US" dirty="0"/>
-              <a:t>Multicollinearity between number of views and number of products</a:t>
+              <a:t>Collinearity between number of views and number of products</a:t>
             </a:r>
           </a:p>
           <a:p>
@@ -18621,11 +18628,11 @@
   <p:clrMapOvr>
     <a:masterClrMapping/>
   </p:clrMapOvr>
-  <mc:AlternateContent xmlns:mc="http://schemas.openxmlformats.org/markup-compatibility/2006">
-    <mc:Choice xmlns:p14="http://schemas.microsoft.com/office/powerpoint/2010/main" Requires="p14">
+  <mc:AlternateContent xmlns:mc="http://schemas.openxmlformats.org/markup-compatibility/2006" xmlns:p14="http://schemas.microsoft.com/office/powerpoint/2010/main">
+    <mc:Choice Requires="p14">
       <p:transition spd="slow" p14:dur="2000" advTm="107"/>
     </mc:Choice>
-    <mc:Fallback>
+    <mc:Fallback xmlns="">
       <p:transition spd="slow" advTm="107"/>
     </mc:Fallback>
   </mc:AlternateContent>
@@ -19166,11 +19173,11 @@
   <p:clrMapOvr>
     <a:masterClrMapping/>
   </p:clrMapOvr>
-  <mc:AlternateContent xmlns:mc="http://schemas.openxmlformats.org/markup-compatibility/2006">
-    <mc:Choice xmlns:p14="http://schemas.microsoft.com/office/powerpoint/2010/main" Requires="p14">
+  <mc:AlternateContent xmlns:mc="http://schemas.openxmlformats.org/markup-compatibility/2006" xmlns:p14="http://schemas.microsoft.com/office/powerpoint/2010/main">
+    <mc:Choice Requires="p14">
       <p:transition spd="slow" p14:dur="2000" advTm="107"/>
     </mc:Choice>
-    <mc:Fallback>
+    <mc:Fallback xmlns="">
       <p:transition spd="slow" advTm="107"/>
     </mc:Fallback>
   </mc:AlternateContent>
@@ -20207,7 +20214,7 @@
           <p:nvPr>
             <p:extLst>
               <p:ext uri="{D42A27DB-BD31-4B8C-83A1-F6EECF244321}">
-                <p14:modId xmlns:p14="http://schemas.microsoft.com/office/powerpoint/2010/main" val="4118041144"/>
+                <p14:modId xmlns:p14="http://schemas.microsoft.com/office/powerpoint/2010/main" val="915745430"/>
               </p:ext>
             </p:extLst>
           </p:nvPr>
@@ -20257,9 +20264,10 @@
                     <a:p>
                       <a:pPr algn="ctr"/>
                       <a:r>
-                        <a:rPr lang="en-US" sz="2200" b="1" dirty="0"/>
-                        <a:t>Random Forest</a:t>
+                        <a:rPr lang="en-US" sz="2200" b="1" dirty="0" err="1"/>
+                        <a:t>XGBoost</a:t>
                       </a:r>
+                      <a:endParaRPr lang="en-US" sz="2200" b="1" dirty="0"/>
                     </a:p>
                   </a:txBody>
                   <a:tcPr anchor="ctr"/>
@@ -22654,11 +22662,11 @@
   <p:clrMapOvr>
     <a:masterClrMapping/>
   </p:clrMapOvr>
-  <mc:AlternateContent xmlns:mc="http://schemas.openxmlformats.org/markup-compatibility/2006">
-    <mc:Choice xmlns:p14="http://schemas.microsoft.com/office/powerpoint/2010/main" Requires="p14">
+  <mc:AlternateContent xmlns:mc="http://schemas.openxmlformats.org/markup-compatibility/2006" xmlns:p14="http://schemas.microsoft.com/office/powerpoint/2010/main">
+    <mc:Choice Requires="p14">
       <p:transition spd="slow" p14:dur="2000" advTm="120"/>
     </mc:Choice>
-    <mc:Fallback>
+    <mc:Fallback xmlns="">
       <p:transition spd="slow" advTm="120"/>
     </mc:Fallback>
   </mc:AlternateContent>
@@ -24894,11 +24902,11 @@
   <p:clrMapOvr>
     <a:masterClrMapping/>
   </p:clrMapOvr>
-  <mc:AlternateContent xmlns:mc="http://schemas.openxmlformats.org/markup-compatibility/2006">
-    <mc:Choice xmlns:p14="http://schemas.microsoft.com/office/powerpoint/2010/main" Requires="p14">
+  <mc:AlternateContent xmlns:mc="http://schemas.openxmlformats.org/markup-compatibility/2006" xmlns:p14="http://schemas.microsoft.com/office/powerpoint/2010/main">
+    <mc:Choice Requires="p14">
       <p:transition spd="slow" p14:dur="2000" advTm="107"/>
     </mc:Choice>
-    <mc:Fallback>
+    <mc:Fallback xmlns="">
       <p:transition spd="slow" advTm="107"/>
     </mc:Fallback>
   </mc:AlternateContent>
@@ -25851,11 +25859,11 @@
   <p:clrMapOvr>
     <a:masterClrMapping/>
   </p:clrMapOvr>
-  <mc:AlternateContent xmlns:mc="http://schemas.openxmlformats.org/markup-compatibility/2006">
-    <mc:Choice xmlns:p14="http://schemas.microsoft.com/office/powerpoint/2010/main" Requires="p14">
+  <mc:AlternateContent xmlns:mc="http://schemas.openxmlformats.org/markup-compatibility/2006" xmlns:p14="http://schemas.microsoft.com/office/powerpoint/2010/main">
+    <mc:Choice Requires="p14">
       <p:transition spd="slow" p14:dur="2000" advTm="115"/>
     </mc:Choice>
-    <mc:Fallback>
+    <mc:Fallback xmlns="">
       <p:transition spd="slow" advTm="115"/>
     </mc:Fallback>
   </mc:AlternateContent>
@@ -26439,11 +26447,11 @@
   <p:clrMapOvr>
     <a:masterClrMapping/>
   </p:clrMapOvr>
-  <mc:AlternateContent xmlns:mc="http://schemas.openxmlformats.org/markup-compatibility/2006">
-    <mc:Choice xmlns:p14="http://schemas.microsoft.com/office/powerpoint/2010/main" Requires="p14">
+  <mc:AlternateContent xmlns:mc="http://schemas.openxmlformats.org/markup-compatibility/2006" xmlns:p14="http://schemas.microsoft.com/office/powerpoint/2010/main">
+    <mc:Choice Requires="p14">
       <p:transition spd="slow" p14:dur="2000" advTm="40417"/>
     </mc:Choice>
-    <mc:Fallback>
+    <mc:Fallback xmlns="">
       <p:transition spd="slow" advTm="40417"/>
     </mc:Fallback>
   </mc:AlternateContent>
@@ -26580,11 +26588,11 @@
   <p:clrMapOvr>
     <a:masterClrMapping/>
   </p:clrMapOvr>
-  <mc:AlternateContent xmlns:mc="http://schemas.openxmlformats.org/markup-compatibility/2006">
-    <mc:Choice xmlns:p14="http://schemas.microsoft.com/office/powerpoint/2010/main" Requires="p14">
+  <mc:AlternateContent xmlns:mc="http://schemas.openxmlformats.org/markup-compatibility/2006" xmlns:p14="http://schemas.microsoft.com/office/powerpoint/2010/main">
+    <mc:Choice Requires="p14">
       <p:transition spd="slow" p14:dur="2000" advTm="229530"/>
     </mc:Choice>
-    <mc:Fallback>
+    <mc:Fallback xmlns="">
       <p:transition spd="slow" advTm="229530"/>
     </mc:Fallback>
   </mc:AlternateContent>
@@ -27174,11 +27182,11 @@
   <p:clrMapOvr>
     <a:masterClrMapping/>
   </p:clrMapOvr>
-  <mc:AlternateContent xmlns:mc="http://schemas.openxmlformats.org/markup-compatibility/2006">
-    <mc:Choice xmlns:p14="http://schemas.microsoft.com/office/powerpoint/2010/main" Requires="p14">
+  <mc:AlternateContent xmlns:mc="http://schemas.openxmlformats.org/markup-compatibility/2006" xmlns:p14="http://schemas.microsoft.com/office/powerpoint/2010/main">
+    <mc:Choice Requires="p14">
       <p:transition spd="slow" p14:dur="2000" advTm="91416"/>
     </mc:Choice>
-    <mc:Fallback>
+    <mc:Fallback xmlns="">
       <p:transition spd="slow" advTm="91416"/>
     </mc:Fallback>
   </mc:AlternateContent>
@@ -27538,11 +27546,11 @@
   <p:clrMapOvr>
     <a:masterClrMapping/>
   </p:clrMapOvr>
-  <mc:AlternateContent xmlns:mc="http://schemas.openxmlformats.org/markup-compatibility/2006">
-    <mc:Choice xmlns:p14="http://schemas.microsoft.com/office/powerpoint/2010/main" Requires="p14">
+  <mc:AlternateContent xmlns:mc="http://schemas.openxmlformats.org/markup-compatibility/2006" xmlns:p14="http://schemas.microsoft.com/office/powerpoint/2010/main">
+    <mc:Choice Requires="p14">
       <p:transition spd="slow" p14:dur="2000" advTm="124"/>
     </mc:Choice>
-    <mc:Fallback>
+    <mc:Fallback xmlns="">
       <p:transition spd="slow" advTm="124"/>
     </mc:Fallback>
   </mc:AlternateContent>

</xml_diff>